<commit_message>
Update the figure 1
</commit_message>
<xml_diff>
--- a/sequential_vs_distributed.pptx
+++ b/sequential_vs_distributed.pptx
@@ -288,7 +288,7 @@
           <a:p>
             <a:fld id="{B4BB96F5-4FFB-E94B-BE76-2B3544E5BF2F}" type="datetimeFigureOut">
               <a:rPr lang="en-US" smtClean="0"/>
-              <a:t>10/4/13</a:t>
+              <a:t>10/5/13</a:t>
             </a:fld>
             <a:endParaRPr lang="en-US"/>
           </a:p>
@@ -458,7 +458,7 @@
           <a:p>
             <a:fld id="{B4BB96F5-4FFB-E94B-BE76-2B3544E5BF2F}" type="datetimeFigureOut">
               <a:rPr lang="en-US" smtClean="0"/>
-              <a:t>10/4/13</a:t>
+              <a:t>10/5/13</a:t>
             </a:fld>
             <a:endParaRPr lang="en-US"/>
           </a:p>
@@ -638,7 +638,7 @@
           <a:p>
             <a:fld id="{B4BB96F5-4FFB-E94B-BE76-2B3544E5BF2F}" type="datetimeFigureOut">
               <a:rPr lang="en-US" smtClean="0"/>
-              <a:t>10/4/13</a:t>
+              <a:t>10/5/13</a:t>
             </a:fld>
             <a:endParaRPr lang="en-US"/>
           </a:p>
@@ -808,7 +808,7 @@
           <a:p>
             <a:fld id="{B4BB96F5-4FFB-E94B-BE76-2B3544E5BF2F}" type="datetimeFigureOut">
               <a:rPr lang="en-US" smtClean="0"/>
-              <a:t>10/4/13</a:t>
+              <a:t>10/5/13</a:t>
             </a:fld>
             <a:endParaRPr lang="en-US"/>
           </a:p>
@@ -1054,7 +1054,7 @@
           <a:p>
             <a:fld id="{B4BB96F5-4FFB-E94B-BE76-2B3544E5BF2F}" type="datetimeFigureOut">
               <a:rPr lang="en-US" smtClean="0"/>
-              <a:t>10/4/13</a:t>
+              <a:t>10/5/13</a:t>
             </a:fld>
             <a:endParaRPr lang="en-US"/>
           </a:p>
@@ -1342,7 +1342,7 @@
           <a:p>
             <a:fld id="{B4BB96F5-4FFB-E94B-BE76-2B3544E5BF2F}" type="datetimeFigureOut">
               <a:rPr lang="en-US" smtClean="0"/>
-              <a:t>10/4/13</a:t>
+              <a:t>10/5/13</a:t>
             </a:fld>
             <a:endParaRPr lang="en-US"/>
           </a:p>
@@ -1764,7 +1764,7 @@
           <a:p>
             <a:fld id="{B4BB96F5-4FFB-E94B-BE76-2B3544E5BF2F}" type="datetimeFigureOut">
               <a:rPr lang="en-US" smtClean="0"/>
-              <a:t>10/4/13</a:t>
+              <a:t>10/5/13</a:t>
             </a:fld>
             <a:endParaRPr lang="en-US"/>
           </a:p>
@@ -1882,7 +1882,7 @@
           <a:p>
             <a:fld id="{B4BB96F5-4FFB-E94B-BE76-2B3544E5BF2F}" type="datetimeFigureOut">
               <a:rPr lang="en-US" smtClean="0"/>
-              <a:t>10/4/13</a:t>
+              <a:t>10/5/13</a:t>
             </a:fld>
             <a:endParaRPr lang="en-US"/>
           </a:p>
@@ -1977,7 +1977,7 @@
           <a:p>
             <a:fld id="{B4BB96F5-4FFB-E94B-BE76-2B3544E5BF2F}" type="datetimeFigureOut">
               <a:rPr lang="en-US" smtClean="0"/>
-              <a:t>10/4/13</a:t>
+              <a:t>10/5/13</a:t>
             </a:fld>
             <a:endParaRPr lang="en-US"/>
           </a:p>
@@ -2254,7 +2254,7 @@
           <a:p>
             <a:fld id="{B4BB96F5-4FFB-E94B-BE76-2B3544E5BF2F}" type="datetimeFigureOut">
               <a:rPr lang="en-US" smtClean="0"/>
-              <a:t>10/4/13</a:t>
+              <a:t>10/5/13</a:t>
             </a:fld>
             <a:endParaRPr lang="en-US"/>
           </a:p>
@@ -2507,7 +2507,7 @@
           <a:p>
             <a:fld id="{B4BB96F5-4FFB-E94B-BE76-2B3544E5BF2F}" type="datetimeFigureOut">
               <a:rPr lang="en-US" smtClean="0"/>
-              <a:t>10/4/13</a:t>
+              <a:t>10/5/13</a:t>
             </a:fld>
             <a:endParaRPr lang="en-US"/>
           </a:p>
@@ -2720,7 +2720,7 @@
           <a:p>
             <a:fld id="{B4BB96F5-4FFB-E94B-BE76-2B3544E5BF2F}" type="datetimeFigureOut">
               <a:rPr lang="en-US" smtClean="0"/>
-              <a:t>10/4/13</a:t>
+              <a:t>10/5/13</a:t>
             </a:fld>
             <a:endParaRPr lang="en-US"/>
           </a:p>
@@ -3194,15 +3194,7 @@
             <a:pPr algn="ctr"/>
             <a:r>
               <a:rPr lang="en-US" dirty="0" smtClean="0"/>
-              <a:t>(Local Order, Segment </a:t>
-            </a:r>
-            <a:r>
-              <a:rPr lang="en-US" dirty="0" smtClean="0"/>
-              <a:t>1</a:t>
-            </a:r>
-            <a:r>
-              <a:rPr lang="en-US" dirty="0" smtClean="0"/>
-              <a:t>)</a:t>
+              <a:t>(Local Order, Segment 1)</a:t>
             </a:r>
           </a:p>
         </p:txBody>
@@ -3250,13 +3242,8 @@
             <a:pPr algn="ctr"/>
             <a:r>
               <a:rPr lang="en-US" dirty="0" smtClean="0"/>
-              <a:t>(Local Order, Segment </a:t>
-            </a:r>
-            <a:r>
-              <a:rPr lang="en-US" dirty="0" smtClean="0"/>
-              <a:t>2)</a:t>
-            </a:r>
-            <a:endParaRPr lang="en-US" dirty="0" smtClean="0"/>
+              <a:t>(Local Order, Segment 2)</a:t>
+            </a:r>
           </a:p>
         </p:txBody>
       </p:sp>
@@ -3303,141 +3290,619 @@
             <a:pPr algn="ctr"/>
             <a:r>
               <a:rPr lang="en-US" dirty="0" smtClean="0"/>
-              <a:t>(Local Order, Segment </a:t>
-            </a:r>
-            <a:r>
-              <a:rPr lang="en-US" dirty="0" smtClean="0"/>
-              <a:t>S)</a:t>
-            </a:r>
-            <a:endParaRPr lang="en-US" dirty="0" smtClean="0"/>
+              <a:t>(Local Order, Segment S)</a:t>
+            </a:r>
+          </a:p>
+        </p:txBody>
+      </p:sp>
+      <p:sp>
+        <p:nvSpPr>
+          <p:cNvPr id="29" name="Rectangle 28"/>
+          <p:cNvSpPr/>
+          <p:nvPr/>
+        </p:nvSpPr>
+        <p:spPr>
+          <a:xfrm>
+            <a:off x="583184" y="1928498"/>
+            <a:ext cx="228600" cy="812440"/>
+          </a:xfrm>
+          <a:prstGeom prst="rect">
+            <a:avLst/>
+          </a:prstGeom>
+          <a:solidFill>
+            <a:schemeClr val="accent1">
+              <a:lumMod val="60000"/>
+              <a:lumOff val="40000"/>
+            </a:schemeClr>
+          </a:solidFill>
+        </p:spPr>
+        <p:style>
+          <a:lnRef idx="1">
+            <a:schemeClr val="accent1"/>
+          </a:lnRef>
+          <a:fillRef idx="3">
+            <a:schemeClr val="accent1"/>
+          </a:fillRef>
+          <a:effectRef idx="2">
+            <a:schemeClr val="accent1"/>
+          </a:effectRef>
+          <a:fontRef idx="minor">
+            <a:schemeClr val="lt1"/>
+          </a:fontRef>
+        </p:style>
+        <p:txBody>
+          <a:bodyPr rtlCol="0" anchor="ctr"/>
+          <a:lstStyle/>
+          <a:p>
+            <a:pPr algn="ctr"/>
+            <a:endParaRPr lang="en-US"/>
+          </a:p>
+        </p:txBody>
+      </p:sp>
+      <p:sp>
+        <p:nvSpPr>
+          <p:cNvPr id="31" name="Rectangle 30"/>
+          <p:cNvSpPr/>
+          <p:nvPr/>
+        </p:nvSpPr>
+        <p:spPr>
+          <a:xfrm>
+            <a:off x="1173734" y="1928498"/>
+            <a:ext cx="228600" cy="812440"/>
+          </a:xfrm>
+          <a:prstGeom prst="rect">
+            <a:avLst/>
+          </a:prstGeom>
+          <a:solidFill>
+            <a:schemeClr val="tx2">
+              <a:lumMod val="50000"/>
+            </a:schemeClr>
+          </a:solidFill>
+        </p:spPr>
+        <p:style>
+          <a:lnRef idx="1">
+            <a:schemeClr val="accent1"/>
+          </a:lnRef>
+          <a:fillRef idx="3">
+            <a:schemeClr val="accent1"/>
+          </a:fillRef>
+          <a:effectRef idx="2">
+            <a:schemeClr val="accent1"/>
+          </a:effectRef>
+          <a:fontRef idx="minor">
+            <a:schemeClr val="lt1"/>
+          </a:fontRef>
+        </p:style>
+        <p:txBody>
+          <a:bodyPr rtlCol="0" anchor="ctr"/>
+          <a:lstStyle/>
+          <a:p>
+            <a:pPr algn="ctr"/>
+            <a:endParaRPr lang="en-US"/>
+          </a:p>
+        </p:txBody>
+      </p:sp>
+      <p:sp>
+        <p:nvSpPr>
+          <p:cNvPr id="32" name="Rectangle 31"/>
+          <p:cNvSpPr/>
+          <p:nvPr/>
+        </p:nvSpPr>
+        <p:spPr>
+          <a:xfrm>
+            <a:off x="878459" y="1928498"/>
+            <a:ext cx="228600" cy="812440"/>
+          </a:xfrm>
+          <a:prstGeom prst="rect">
+            <a:avLst/>
+          </a:prstGeom>
+          <a:solidFill>
+            <a:schemeClr val="accent1">
+              <a:lumMod val="75000"/>
+            </a:schemeClr>
+          </a:solidFill>
+        </p:spPr>
+        <p:style>
+          <a:lnRef idx="1">
+            <a:schemeClr val="accent1"/>
+          </a:lnRef>
+          <a:fillRef idx="3">
+            <a:schemeClr val="accent1"/>
+          </a:fillRef>
+          <a:effectRef idx="2">
+            <a:schemeClr val="accent1"/>
+          </a:effectRef>
+          <a:fontRef idx="minor">
+            <a:schemeClr val="lt1"/>
+          </a:fontRef>
+        </p:style>
+        <p:txBody>
+          <a:bodyPr rtlCol="0" anchor="ctr"/>
+          <a:lstStyle/>
+          <a:p>
+            <a:pPr algn="ctr"/>
+            <a:endParaRPr lang="en-US"/>
+          </a:p>
+        </p:txBody>
+      </p:sp>
+      <p:sp>
+        <p:nvSpPr>
+          <p:cNvPr id="40" name="Right Arrow 39"/>
+          <p:cNvSpPr/>
+          <p:nvPr/>
+        </p:nvSpPr>
+        <p:spPr>
+          <a:xfrm rot="5400000" flipV="1">
+            <a:off x="1685798" y="2749574"/>
+            <a:ext cx="349504" cy="484632"/>
+          </a:xfrm>
+          <a:prstGeom prst="rightArrow">
+            <a:avLst/>
+          </a:prstGeom>
+        </p:spPr>
+        <p:style>
+          <a:lnRef idx="1">
+            <a:schemeClr val="accent1"/>
+          </a:lnRef>
+          <a:fillRef idx="3">
+            <a:schemeClr val="accent1"/>
+          </a:fillRef>
+          <a:effectRef idx="2">
+            <a:schemeClr val="accent1"/>
+          </a:effectRef>
+          <a:fontRef idx="minor">
+            <a:schemeClr val="lt1"/>
+          </a:fontRef>
+        </p:style>
+        <p:txBody>
+          <a:bodyPr rtlCol="0" anchor="ctr"/>
+          <a:lstStyle/>
+          <a:p>
+            <a:pPr algn="ctr"/>
+            <a:endParaRPr lang="en-US"/>
+          </a:p>
+        </p:txBody>
+      </p:sp>
+      <p:sp>
+        <p:nvSpPr>
+          <p:cNvPr id="41" name="Right Arrow 40"/>
+          <p:cNvSpPr/>
+          <p:nvPr/>
+        </p:nvSpPr>
+        <p:spPr>
+          <a:xfrm>
+            <a:off x="5483679" y="1397000"/>
+            <a:ext cx="349504" cy="304800"/>
+          </a:xfrm>
+          <a:prstGeom prst="rightArrow">
+            <a:avLst/>
+          </a:prstGeom>
+        </p:spPr>
+        <p:style>
+          <a:lnRef idx="1">
+            <a:schemeClr val="accent1"/>
+          </a:lnRef>
+          <a:fillRef idx="3">
+            <a:schemeClr val="accent1"/>
+          </a:fillRef>
+          <a:effectRef idx="2">
+            <a:schemeClr val="accent1"/>
+          </a:effectRef>
+          <a:fontRef idx="minor">
+            <a:schemeClr val="lt1"/>
+          </a:fontRef>
+        </p:style>
+        <p:txBody>
+          <a:bodyPr rtlCol="0" anchor="ctr"/>
+          <a:lstStyle/>
+          <a:p>
+            <a:pPr algn="ctr"/>
+            <a:endParaRPr lang="en-US"/>
+          </a:p>
+        </p:txBody>
+      </p:sp>
+      <p:sp>
+        <p:nvSpPr>
+          <p:cNvPr id="52" name="Right Arrow 51"/>
+          <p:cNvSpPr/>
+          <p:nvPr/>
+        </p:nvSpPr>
+        <p:spPr>
+          <a:xfrm>
+            <a:off x="5470979" y="2794000"/>
+            <a:ext cx="349504" cy="304800"/>
+          </a:xfrm>
+          <a:prstGeom prst="rightArrow">
+            <a:avLst/>
+          </a:prstGeom>
+        </p:spPr>
+        <p:style>
+          <a:lnRef idx="1">
+            <a:schemeClr val="accent1"/>
+          </a:lnRef>
+          <a:fillRef idx="3">
+            <a:schemeClr val="accent1"/>
+          </a:fillRef>
+          <a:effectRef idx="2">
+            <a:schemeClr val="accent1"/>
+          </a:effectRef>
+          <a:fontRef idx="minor">
+            <a:schemeClr val="lt1"/>
+          </a:fontRef>
+        </p:style>
+        <p:txBody>
+          <a:bodyPr rtlCol="0" anchor="ctr"/>
+          <a:lstStyle/>
+          <a:p>
+            <a:pPr algn="ctr"/>
+            <a:endParaRPr lang="en-US"/>
+          </a:p>
+        </p:txBody>
+      </p:sp>
+      <p:sp>
+        <p:nvSpPr>
+          <p:cNvPr id="60" name="Right Arrow 59"/>
+          <p:cNvSpPr/>
+          <p:nvPr/>
+        </p:nvSpPr>
+        <p:spPr>
+          <a:xfrm>
+            <a:off x="5470979" y="4546240"/>
+            <a:ext cx="349504" cy="304800"/>
+          </a:xfrm>
+          <a:prstGeom prst="rightArrow">
+            <a:avLst/>
+          </a:prstGeom>
+        </p:spPr>
+        <p:style>
+          <a:lnRef idx="1">
+            <a:schemeClr val="accent1"/>
+          </a:lnRef>
+          <a:fillRef idx="3">
+            <a:schemeClr val="accent1"/>
+          </a:fillRef>
+          <a:effectRef idx="2">
+            <a:schemeClr val="accent1"/>
+          </a:effectRef>
+          <a:fontRef idx="minor">
+            <a:schemeClr val="lt1"/>
+          </a:fontRef>
+        </p:style>
+        <p:txBody>
+          <a:bodyPr rtlCol="0" anchor="ctr"/>
+          <a:lstStyle/>
+          <a:p>
+            <a:pPr algn="ctr"/>
+            <a:endParaRPr lang="en-US"/>
+          </a:p>
+        </p:txBody>
+      </p:sp>
+      <p:cxnSp>
+        <p:nvCxnSpPr>
+          <p:cNvPr id="5" name="Straight Connector 4"/>
+          <p:cNvCxnSpPr/>
+          <p:nvPr/>
+        </p:nvCxnSpPr>
+        <p:spPr>
+          <a:xfrm>
+            <a:off x="6738698" y="3606800"/>
+            <a:ext cx="0" cy="352303"/>
+          </a:xfrm>
+          <a:prstGeom prst="line">
+            <a:avLst/>
+          </a:prstGeom>
+          <a:ln>
+            <a:solidFill>
+              <a:srgbClr val="4F81BD"/>
+            </a:solidFill>
+            <a:prstDash val="sysDash"/>
+          </a:ln>
+        </p:spPr>
+        <p:style>
+          <a:lnRef idx="2">
+            <a:schemeClr val="accent1"/>
+          </a:lnRef>
+          <a:fillRef idx="0">
+            <a:schemeClr val="accent1"/>
+          </a:fillRef>
+          <a:effectRef idx="1">
+            <a:schemeClr val="accent1"/>
+          </a:effectRef>
+          <a:fontRef idx="minor">
+            <a:schemeClr val="tx1"/>
+          </a:fontRef>
+        </p:style>
+      </p:cxnSp>
+      <p:sp>
+        <p:nvSpPr>
+          <p:cNvPr id="39" name="Rectangle 38"/>
+          <p:cNvSpPr/>
+          <p:nvPr/>
+        </p:nvSpPr>
+        <p:spPr>
+          <a:xfrm>
+            <a:off x="1473200" y="1928498"/>
+            <a:ext cx="228600" cy="812440"/>
+          </a:xfrm>
+          <a:prstGeom prst="rect">
+            <a:avLst/>
+          </a:prstGeom>
+          <a:solidFill>
+            <a:schemeClr val="accent3">
+              <a:lumMod val="60000"/>
+              <a:lumOff val="40000"/>
+            </a:schemeClr>
+          </a:solidFill>
+        </p:spPr>
+        <p:style>
+          <a:lnRef idx="1">
+            <a:schemeClr val="accent1"/>
+          </a:lnRef>
+          <a:fillRef idx="3">
+            <a:schemeClr val="accent1"/>
+          </a:fillRef>
+          <a:effectRef idx="2">
+            <a:schemeClr val="accent1"/>
+          </a:effectRef>
+          <a:fontRef idx="minor">
+            <a:schemeClr val="lt1"/>
+          </a:fontRef>
+        </p:style>
+        <p:txBody>
+          <a:bodyPr rtlCol="0" anchor="ctr"/>
+          <a:lstStyle/>
+          <a:p>
+            <a:pPr algn="ctr"/>
+            <a:endParaRPr lang="en-US"/>
+          </a:p>
+        </p:txBody>
+      </p:sp>
+      <p:sp>
+        <p:nvSpPr>
+          <p:cNvPr id="42" name="Rectangle 41"/>
+          <p:cNvSpPr/>
+          <p:nvPr/>
+        </p:nvSpPr>
+        <p:spPr>
+          <a:xfrm>
+            <a:off x="2063750" y="1928498"/>
+            <a:ext cx="228600" cy="812440"/>
+          </a:xfrm>
+          <a:prstGeom prst="rect">
+            <a:avLst/>
+          </a:prstGeom>
+          <a:solidFill>
+            <a:schemeClr val="accent3">
+              <a:lumMod val="50000"/>
+            </a:schemeClr>
+          </a:solidFill>
+        </p:spPr>
+        <p:style>
+          <a:lnRef idx="1">
+            <a:schemeClr val="accent1"/>
+          </a:lnRef>
+          <a:fillRef idx="3">
+            <a:schemeClr val="accent1"/>
+          </a:fillRef>
+          <a:effectRef idx="2">
+            <a:schemeClr val="accent1"/>
+          </a:effectRef>
+          <a:fontRef idx="minor">
+            <a:schemeClr val="lt1"/>
+          </a:fontRef>
+        </p:style>
+        <p:txBody>
+          <a:bodyPr rtlCol="0" anchor="ctr"/>
+          <a:lstStyle/>
+          <a:p>
+            <a:pPr algn="ctr"/>
+            <a:endParaRPr lang="en-US"/>
+          </a:p>
+        </p:txBody>
+      </p:sp>
+      <p:sp>
+        <p:nvSpPr>
+          <p:cNvPr id="43" name="Rectangle 42"/>
+          <p:cNvSpPr/>
+          <p:nvPr/>
+        </p:nvSpPr>
+        <p:spPr>
+          <a:xfrm>
+            <a:off x="1768475" y="1928498"/>
+            <a:ext cx="228600" cy="812440"/>
+          </a:xfrm>
+          <a:prstGeom prst="rect">
+            <a:avLst/>
+          </a:prstGeom>
+          <a:solidFill>
+            <a:schemeClr val="accent3">
+              <a:lumMod val="75000"/>
+            </a:schemeClr>
+          </a:solidFill>
+        </p:spPr>
+        <p:style>
+          <a:lnRef idx="1">
+            <a:schemeClr val="accent1"/>
+          </a:lnRef>
+          <a:fillRef idx="3">
+            <a:schemeClr val="accent1"/>
+          </a:fillRef>
+          <a:effectRef idx="2">
+            <a:schemeClr val="accent1"/>
+          </a:effectRef>
+          <a:fontRef idx="minor">
+            <a:schemeClr val="lt1"/>
+          </a:fontRef>
+        </p:style>
+        <p:txBody>
+          <a:bodyPr rtlCol="0" anchor="ctr"/>
+          <a:lstStyle/>
+          <a:p>
+            <a:pPr algn="ctr"/>
+            <a:endParaRPr lang="en-US"/>
+          </a:p>
+        </p:txBody>
+      </p:sp>
+      <p:sp>
+        <p:nvSpPr>
+          <p:cNvPr id="44" name="Rectangle 43"/>
+          <p:cNvSpPr/>
+          <p:nvPr/>
+        </p:nvSpPr>
+        <p:spPr>
+          <a:xfrm>
+            <a:off x="2368550" y="1928498"/>
+            <a:ext cx="228600" cy="812440"/>
+          </a:xfrm>
+          <a:prstGeom prst="rect">
+            <a:avLst/>
+          </a:prstGeom>
+          <a:solidFill>
+            <a:schemeClr val="accent6">
+              <a:lumMod val="60000"/>
+              <a:lumOff val="40000"/>
+            </a:schemeClr>
+          </a:solidFill>
+        </p:spPr>
+        <p:style>
+          <a:lnRef idx="1">
+            <a:schemeClr val="accent1"/>
+          </a:lnRef>
+          <a:fillRef idx="3">
+            <a:schemeClr val="accent1"/>
+          </a:fillRef>
+          <a:effectRef idx="2">
+            <a:schemeClr val="accent1"/>
+          </a:effectRef>
+          <a:fontRef idx="minor">
+            <a:schemeClr val="lt1"/>
+          </a:fontRef>
+        </p:style>
+        <p:txBody>
+          <a:bodyPr rtlCol="0" anchor="ctr"/>
+          <a:lstStyle/>
+          <a:p>
+            <a:pPr algn="ctr"/>
+            <a:endParaRPr lang="en-US"/>
+          </a:p>
+        </p:txBody>
+      </p:sp>
+      <p:sp>
+        <p:nvSpPr>
+          <p:cNvPr id="45" name="Rectangle 44"/>
+          <p:cNvSpPr/>
+          <p:nvPr/>
+        </p:nvSpPr>
+        <p:spPr>
+          <a:xfrm>
+            <a:off x="2959100" y="1928498"/>
+            <a:ext cx="228600" cy="812440"/>
+          </a:xfrm>
+          <a:prstGeom prst="rect">
+            <a:avLst/>
+          </a:prstGeom>
+          <a:solidFill>
+            <a:schemeClr val="accent6">
+              <a:lumMod val="50000"/>
+            </a:schemeClr>
+          </a:solidFill>
+        </p:spPr>
+        <p:style>
+          <a:lnRef idx="1">
+            <a:schemeClr val="accent1"/>
+          </a:lnRef>
+          <a:fillRef idx="3">
+            <a:schemeClr val="accent1"/>
+          </a:fillRef>
+          <a:effectRef idx="2">
+            <a:schemeClr val="accent1"/>
+          </a:effectRef>
+          <a:fontRef idx="minor">
+            <a:schemeClr val="lt1"/>
+          </a:fontRef>
+        </p:style>
+        <p:txBody>
+          <a:bodyPr rtlCol="0" anchor="ctr"/>
+          <a:lstStyle/>
+          <a:p>
+            <a:pPr algn="ctr"/>
+            <a:endParaRPr lang="en-US"/>
+          </a:p>
+        </p:txBody>
+      </p:sp>
+      <p:sp>
+        <p:nvSpPr>
+          <p:cNvPr id="46" name="Rectangle 45"/>
+          <p:cNvSpPr/>
+          <p:nvPr/>
+        </p:nvSpPr>
+        <p:spPr>
+          <a:xfrm>
+            <a:off x="2663825" y="1928498"/>
+            <a:ext cx="228600" cy="812440"/>
+          </a:xfrm>
+          <a:prstGeom prst="rect">
+            <a:avLst/>
+          </a:prstGeom>
+          <a:solidFill>
+            <a:schemeClr val="accent6">
+              <a:lumMod val="75000"/>
+            </a:schemeClr>
+          </a:solidFill>
+        </p:spPr>
+        <p:style>
+          <a:lnRef idx="1">
+            <a:schemeClr val="accent1"/>
+          </a:lnRef>
+          <a:fillRef idx="3">
+            <a:schemeClr val="accent1"/>
+          </a:fillRef>
+          <a:effectRef idx="2">
+            <a:schemeClr val="accent1"/>
+          </a:effectRef>
+          <a:fontRef idx="minor">
+            <a:schemeClr val="lt1"/>
+          </a:fontRef>
+        </p:style>
+        <p:txBody>
+          <a:bodyPr rtlCol="0" anchor="ctr"/>
+          <a:lstStyle/>
+          <a:p>
+            <a:pPr algn="ctr"/>
+            <a:endParaRPr lang="en-US"/>
           </a:p>
         </p:txBody>
       </p:sp>
       <p:grpSp>
         <p:nvGrpSpPr>
-          <p:cNvPr id="28" name="Group 27"/>
+          <p:cNvPr id="2" name="Group 1"/>
           <p:cNvGrpSpPr/>
           <p:nvPr/>
         </p:nvGrpSpPr>
         <p:grpSpPr>
           <a:xfrm>
-            <a:off x="1155700" y="1924976"/>
-            <a:ext cx="1409700" cy="812442"/>
-            <a:chOff x="723900" y="2304456"/>
-            <a:chExt cx="1409700" cy="368301"/>
+            <a:off x="4554366" y="1116058"/>
+            <a:ext cx="819150" cy="812440"/>
+            <a:chOff x="4531433" y="1116058"/>
+            <a:chExt cx="819150" cy="812440"/>
           </a:xfrm>
         </p:grpSpPr>
         <p:sp>
           <p:nvSpPr>
-            <p:cNvPr id="29" name="Rectangle 28"/>
+            <p:cNvPr id="47" name="Rectangle 46"/>
             <p:cNvSpPr/>
             <p:nvPr/>
           </p:nvSpPr>
           <p:spPr>
             <a:xfrm>
-              <a:off x="723900" y="2304456"/>
-              <a:ext cx="228600" cy="368300"/>
+              <a:off x="4531433" y="1116058"/>
+              <a:ext cx="228600" cy="812440"/>
             </a:xfrm>
             <a:prstGeom prst="rect">
               <a:avLst/>
             </a:prstGeom>
             <a:solidFill>
-              <a:schemeClr val="tx2">
-                <a:lumMod val="20000"/>
-                <a:lumOff val="80000"/>
-              </a:schemeClr>
-            </a:solidFill>
-          </p:spPr>
-          <p:style>
-            <a:lnRef idx="1">
-              <a:schemeClr val="accent1"/>
-            </a:lnRef>
-            <a:fillRef idx="3">
-              <a:schemeClr val="accent1"/>
-            </a:fillRef>
-            <a:effectRef idx="2">
-              <a:schemeClr val="accent1"/>
-            </a:effectRef>
-            <a:fontRef idx="minor">
-              <a:schemeClr val="lt1"/>
-            </a:fontRef>
-          </p:style>
-          <p:txBody>
-            <a:bodyPr rtlCol="0" anchor="ctr"/>
-            <a:lstStyle/>
-            <a:p>
-              <a:pPr algn="ctr"/>
-              <a:endParaRPr lang="en-US"/>
-            </a:p>
-          </p:txBody>
-        </p:sp>
-        <p:sp>
-          <p:nvSpPr>
-            <p:cNvPr id="30" name="Rectangle 29"/>
-            <p:cNvSpPr/>
-            <p:nvPr/>
-          </p:nvSpPr>
-          <p:spPr>
-            <a:xfrm>
-              <a:off x="1609725" y="2304456"/>
-              <a:ext cx="228600" cy="368300"/>
-            </a:xfrm>
-            <a:prstGeom prst="rect">
-              <a:avLst/>
-            </a:prstGeom>
-            <a:solidFill>
-              <a:schemeClr val="tx2">
-                <a:lumMod val="40000"/>
-                <a:lumOff val="60000"/>
-              </a:schemeClr>
-            </a:solidFill>
-          </p:spPr>
-          <p:style>
-            <a:lnRef idx="1">
-              <a:schemeClr val="accent1"/>
-            </a:lnRef>
-            <a:fillRef idx="3">
-              <a:schemeClr val="accent1"/>
-            </a:fillRef>
-            <a:effectRef idx="2">
-              <a:schemeClr val="accent1"/>
-            </a:effectRef>
-            <a:fontRef idx="minor">
-              <a:schemeClr val="lt1"/>
-            </a:fontRef>
-          </p:style>
-          <p:txBody>
-            <a:bodyPr rtlCol="0" anchor="ctr"/>
-            <a:lstStyle/>
-            <a:p>
-              <a:pPr algn="ctr"/>
-              <a:endParaRPr lang="en-US">
-                <a:solidFill>
-                  <a:schemeClr val="tx1">
-                    <a:lumMod val="50000"/>
-                    <a:lumOff val="50000"/>
-                  </a:schemeClr>
-                </a:solidFill>
-              </a:endParaRPr>
-            </a:p>
-          </p:txBody>
-        </p:sp>
-        <p:sp>
-          <p:nvSpPr>
-            <p:cNvPr id="31" name="Rectangle 30"/>
-            <p:cNvSpPr/>
-            <p:nvPr/>
-          </p:nvSpPr>
-          <p:spPr>
-            <a:xfrm>
-              <a:off x="1314450" y="2304456"/>
-              <a:ext cx="228600" cy="368300"/>
-            </a:xfrm>
-            <a:prstGeom prst="rect">
-              <a:avLst/>
-            </a:prstGeom>
-            <a:solidFill>
-              <a:schemeClr val="tx2">
+              <a:schemeClr val="accent1">
                 <a:lumMod val="60000"/>
                 <a:lumOff val="40000"/>
               </a:schemeClr>
@@ -3468,57 +3933,14 @@
         </p:sp>
         <p:sp>
           <p:nvSpPr>
-            <p:cNvPr id="32" name="Rectangle 31"/>
+            <p:cNvPr id="48" name="Rectangle 47"/>
             <p:cNvSpPr/>
             <p:nvPr/>
           </p:nvSpPr>
           <p:spPr>
             <a:xfrm>
-              <a:off x="1019175" y="2304456"/>
-              <a:ext cx="228600" cy="368300"/>
-            </a:xfrm>
-            <a:prstGeom prst="rect">
-              <a:avLst/>
-            </a:prstGeom>
-            <a:solidFill>
-              <a:schemeClr val="tx2">
-                <a:lumMod val="75000"/>
-              </a:schemeClr>
-            </a:solidFill>
-          </p:spPr>
-          <p:style>
-            <a:lnRef idx="1">
-              <a:schemeClr val="accent1"/>
-            </a:lnRef>
-            <a:fillRef idx="3">
-              <a:schemeClr val="accent1"/>
-            </a:fillRef>
-            <a:effectRef idx="2">
-              <a:schemeClr val="accent1"/>
-            </a:effectRef>
-            <a:fontRef idx="minor">
-              <a:schemeClr val="lt1"/>
-            </a:fontRef>
-          </p:style>
-          <p:txBody>
-            <a:bodyPr rtlCol="0" anchor="ctr"/>
-            <a:lstStyle/>
-            <a:p>
-              <a:pPr algn="ctr"/>
-              <a:endParaRPr lang="en-US"/>
-            </a:p>
-          </p:txBody>
-        </p:sp>
-        <p:sp>
-          <p:nvSpPr>
-            <p:cNvPr id="33" name="Rectangle 32"/>
-            <p:cNvSpPr/>
-            <p:nvPr/>
-          </p:nvSpPr>
-          <p:spPr>
-            <a:xfrm>
-              <a:off x="1905000" y="2304457"/>
-              <a:ext cx="228600" cy="368300"/>
+              <a:off x="5121983" y="1116058"/>
+              <a:ext cx="228600" cy="812440"/>
             </a:xfrm>
             <a:prstGeom prst="rect">
               <a:avLst/>
@@ -3552,313 +3974,25 @@
             </a:p>
           </p:txBody>
         </p:sp>
-      </p:grpSp>
-      <p:sp>
-        <p:nvSpPr>
-          <p:cNvPr id="40" name="Right Arrow 39"/>
-          <p:cNvSpPr/>
-          <p:nvPr/>
-        </p:nvSpPr>
-        <p:spPr>
-          <a:xfrm rot="5400000" flipV="1">
-            <a:off x="1685798" y="2749574"/>
-            <a:ext cx="349504" cy="484632"/>
-          </a:xfrm>
-          <a:prstGeom prst="rightArrow">
-            <a:avLst/>
-          </a:prstGeom>
-        </p:spPr>
-        <p:style>
-          <a:lnRef idx="1">
-            <a:schemeClr val="accent1"/>
-          </a:lnRef>
-          <a:fillRef idx="3">
-            <a:schemeClr val="accent1"/>
-          </a:fillRef>
-          <a:effectRef idx="2">
-            <a:schemeClr val="accent1"/>
-          </a:effectRef>
-          <a:fontRef idx="minor">
-            <a:schemeClr val="lt1"/>
-          </a:fontRef>
-        </p:style>
-        <p:txBody>
-          <a:bodyPr rtlCol="0" anchor="ctr"/>
-          <a:lstStyle/>
-          <a:p>
-            <a:pPr algn="ctr"/>
-            <a:endParaRPr lang="en-US"/>
-          </a:p>
-        </p:txBody>
-      </p:sp>
-      <p:grpSp>
-        <p:nvGrpSpPr>
-          <p:cNvPr id="49" name="Group 48"/>
-          <p:cNvGrpSpPr/>
-          <p:nvPr/>
-        </p:nvGrpSpPr>
-        <p:grpSpPr>
-          <a:xfrm>
-            <a:off x="4029783" y="1371600"/>
-            <a:ext cx="1803400" cy="368300"/>
-            <a:chOff x="4724400" y="1676400"/>
-            <a:chExt cx="1803400" cy="368300"/>
-          </a:xfrm>
-        </p:grpSpPr>
-        <p:grpSp>
-          <p:nvGrpSpPr>
-            <p:cNvPr id="22" name="Group 21"/>
-            <p:cNvGrpSpPr/>
-            <p:nvPr/>
-          </p:nvGrpSpPr>
-          <p:grpSpPr>
-            <a:xfrm>
-              <a:off x="4724400" y="1676400"/>
-              <a:ext cx="1409700" cy="368300"/>
-              <a:chOff x="723900" y="2298700"/>
-              <a:chExt cx="1409700" cy="368300"/>
-            </a:xfrm>
-          </p:grpSpPr>
-          <p:sp>
-            <p:nvSpPr>
-              <p:cNvPr id="23" name="Rectangle 22"/>
-              <p:cNvSpPr/>
-              <p:nvPr/>
-            </p:nvSpPr>
-            <p:spPr>
-              <a:xfrm>
-                <a:off x="723900" y="2298700"/>
-                <a:ext cx="228600" cy="368300"/>
-              </a:xfrm>
-              <a:prstGeom prst="rect">
-                <a:avLst/>
-              </a:prstGeom>
-              <a:solidFill>
-                <a:schemeClr val="tx2">
-                  <a:lumMod val="20000"/>
-                  <a:lumOff val="80000"/>
-                </a:schemeClr>
-              </a:solidFill>
-            </p:spPr>
-            <p:style>
-              <a:lnRef idx="1">
-                <a:schemeClr val="accent1"/>
-              </a:lnRef>
-              <a:fillRef idx="3">
-                <a:schemeClr val="accent1"/>
-              </a:fillRef>
-              <a:effectRef idx="2">
-                <a:schemeClr val="accent1"/>
-              </a:effectRef>
-              <a:fontRef idx="minor">
-                <a:schemeClr val="lt1"/>
-              </a:fontRef>
-            </p:style>
-            <p:txBody>
-              <a:bodyPr rtlCol="0" anchor="ctr"/>
-              <a:lstStyle/>
-              <a:p>
-                <a:pPr algn="ctr"/>
-                <a:endParaRPr lang="en-US"/>
-              </a:p>
-            </p:txBody>
-          </p:sp>
-          <p:sp>
-            <p:nvSpPr>
-              <p:cNvPr id="24" name="Rectangle 23"/>
-              <p:cNvSpPr/>
-              <p:nvPr/>
-            </p:nvSpPr>
-            <p:spPr>
-              <a:xfrm>
-                <a:off x="1016000" y="2298700"/>
-                <a:ext cx="228600" cy="368300"/>
-              </a:xfrm>
-              <a:prstGeom prst="rect">
-                <a:avLst/>
-              </a:prstGeom>
-              <a:solidFill>
-                <a:schemeClr val="tx2">
-                  <a:lumMod val="40000"/>
-                  <a:lumOff val="60000"/>
-                </a:schemeClr>
-              </a:solidFill>
-            </p:spPr>
-            <p:style>
-              <a:lnRef idx="1">
-                <a:schemeClr val="accent1"/>
-              </a:lnRef>
-              <a:fillRef idx="3">
-                <a:schemeClr val="accent1"/>
-              </a:fillRef>
-              <a:effectRef idx="2">
-                <a:schemeClr val="accent1"/>
-              </a:effectRef>
-              <a:fontRef idx="minor">
-                <a:schemeClr val="lt1"/>
-              </a:fontRef>
-            </p:style>
-            <p:txBody>
-              <a:bodyPr rtlCol="0" anchor="ctr"/>
-              <a:lstStyle/>
-              <a:p>
-                <a:pPr algn="ctr"/>
-                <a:endParaRPr lang="en-US">
-                  <a:solidFill>
-                    <a:schemeClr val="tx1">
-                      <a:lumMod val="50000"/>
-                      <a:lumOff val="50000"/>
-                    </a:schemeClr>
-                  </a:solidFill>
-                </a:endParaRPr>
-              </a:p>
-            </p:txBody>
-          </p:sp>
-          <p:sp>
-            <p:nvSpPr>
-              <p:cNvPr id="25" name="Rectangle 24"/>
-              <p:cNvSpPr/>
-              <p:nvPr/>
-            </p:nvSpPr>
-            <p:spPr>
-              <a:xfrm>
-                <a:off x="1308100" y="2298700"/>
-                <a:ext cx="228600" cy="368300"/>
-              </a:xfrm>
-              <a:prstGeom prst="rect">
-                <a:avLst/>
-              </a:prstGeom>
-              <a:solidFill>
-                <a:schemeClr val="tx2">
-                  <a:lumMod val="60000"/>
-                  <a:lumOff val="40000"/>
-                </a:schemeClr>
-              </a:solidFill>
-            </p:spPr>
-            <p:style>
-              <a:lnRef idx="1">
-                <a:schemeClr val="accent1"/>
-              </a:lnRef>
-              <a:fillRef idx="3">
-                <a:schemeClr val="accent1"/>
-              </a:fillRef>
-              <a:effectRef idx="2">
-                <a:schemeClr val="accent1"/>
-              </a:effectRef>
-              <a:fontRef idx="minor">
-                <a:schemeClr val="lt1"/>
-              </a:fontRef>
-            </p:style>
-            <p:txBody>
-              <a:bodyPr rtlCol="0" anchor="ctr"/>
-              <a:lstStyle/>
-              <a:p>
-                <a:pPr algn="ctr"/>
-                <a:endParaRPr lang="en-US"/>
-              </a:p>
-            </p:txBody>
-          </p:sp>
-          <p:sp>
-            <p:nvSpPr>
-              <p:cNvPr id="26" name="Rectangle 25"/>
-              <p:cNvSpPr/>
-              <p:nvPr/>
-            </p:nvSpPr>
-            <p:spPr>
-              <a:xfrm>
-                <a:off x="1600200" y="2298700"/>
-                <a:ext cx="228600" cy="368300"/>
-              </a:xfrm>
-              <a:prstGeom prst="rect">
-                <a:avLst/>
-              </a:prstGeom>
-              <a:solidFill>
-                <a:schemeClr val="tx2">
-                  <a:lumMod val="75000"/>
-                </a:schemeClr>
-              </a:solidFill>
-            </p:spPr>
-            <p:style>
-              <a:lnRef idx="1">
-                <a:schemeClr val="accent1"/>
-              </a:lnRef>
-              <a:fillRef idx="3">
-                <a:schemeClr val="accent1"/>
-              </a:fillRef>
-              <a:effectRef idx="2">
-                <a:schemeClr val="accent1"/>
-              </a:effectRef>
-              <a:fontRef idx="minor">
-                <a:schemeClr val="lt1"/>
-              </a:fontRef>
-            </p:style>
-            <p:txBody>
-              <a:bodyPr rtlCol="0" anchor="ctr"/>
-              <a:lstStyle/>
-              <a:p>
-                <a:pPr algn="ctr"/>
-                <a:endParaRPr lang="en-US"/>
-              </a:p>
-            </p:txBody>
-          </p:sp>
-          <p:sp>
-            <p:nvSpPr>
-              <p:cNvPr id="27" name="Rectangle 26"/>
-              <p:cNvSpPr/>
-              <p:nvPr/>
-            </p:nvSpPr>
-            <p:spPr>
-              <a:xfrm>
-                <a:off x="1905000" y="2298700"/>
-                <a:ext cx="228600" cy="368300"/>
-              </a:xfrm>
-              <a:prstGeom prst="rect">
-                <a:avLst/>
-              </a:prstGeom>
-              <a:solidFill>
-                <a:schemeClr val="tx2">
-                  <a:lumMod val="50000"/>
-                </a:schemeClr>
-              </a:solidFill>
-            </p:spPr>
-            <p:style>
-              <a:lnRef idx="1">
-                <a:schemeClr val="accent1"/>
-              </a:lnRef>
-              <a:fillRef idx="3">
-                <a:schemeClr val="accent1"/>
-              </a:fillRef>
-              <a:effectRef idx="2">
-                <a:schemeClr val="accent1"/>
-              </a:effectRef>
-              <a:fontRef idx="minor">
-                <a:schemeClr val="lt1"/>
-              </a:fontRef>
-            </p:style>
-            <p:txBody>
-              <a:bodyPr rtlCol="0" anchor="ctr"/>
-              <a:lstStyle/>
-              <a:p>
-                <a:pPr algn="ctr"/>
-                <a:endParaRPr lang="en-US"/>
-              </a:p>
-            </p:txBody>
-          </p:sp>
-        </p:grpSp>
         <p:sp>
           <p:nvSpPr>
-            <p:cNvPr id="41" name="Right Arrow 40"/>
+            <p:cNvPr id="66" name="Rectangle 65"/>
             <p:cNvSpPr/>
             <p:nvPr/>
           </p:nvSpPr>
           <p:spPr>
             <a:xfrm>
-              <a:off x="6178296" y="1701800"/>
-              <a:ext cx="349504" cy="304800"/>
+              <a:off x="4826708" y="1116058"/>
+              <a:ext cx="228600" cy="812440"/>
             </a:xfrm>
-            <a:prstGeom prst="rightArrow">
+            <a:prstGeom prst="rect">
               <a:avLst/>
             </a:prstGeom>
+            <a:solidFill>
+              <a:schemeClr val="accent1">
+                <a:lumMod val="75000"/>
+              </a:schemeClr>
+            </a:solidFill>
           </p:spPr>
           <p:style>
             <a:lnRef idx="1">
@@ -3886,272 +4020,124 @@
       </p:grpSp>
       <p:grpSp>
         <p:nvGrpSpPr>
-          <p:cNvPr id="50" name="Group 49"/>
+          <p:cNvPr id="3" name="Group 2"/>
           <p:cNvGrpSpPr/>
           <p:nvPr/>
         </p:nvGrpSpPr>
         <p:grpSpPr>
           <a:xfrm>
-            <a:off x="4017083" y="2768600"/>
-            <a:ext cx="1803400" cy="368300"/>
-            <a:chOff x="4724400" y="1676400"/>
-            <a:chExt cx="1803400" cy="368300"/>
+            <a:off x="4554366" y="2514778"/>
+            <a:ext cx="819150" cy="812440"/>
+            <a:chOff x="4554366" y="2504340"/>
+            <a:chExt cx="819150" cy="812440"/>
           </a:xfrm>
         </p:grpSpPr>
-        <p:grpSp>
-          <p:nvGrpSpPr>
-            <p:cNvPr id="51" name="Group 50"/>
-            <p:cNvGrpSpPr/>
-            <p:nvPr/>
-          </p:nvGrpSpPr>
-          <p:grpSpPr>
-            <a:xfrm>
-              <a:off x="4724400" y="1676400"/>
-              <a:ext cx="1409700" cy="368300"/>
-              <a:chOff x="723900" y="2298700"/>
-              <a:chExt cx="1409700" cy="368300"/>
-            </a:xfrm>
-          </p:grpSpPr>
-          <p:sp>
-            <p:nvSpPr>
-              <p:cNvPr id="53" name="Rectangle 52"/>
-              <p:cNvSpPr/>
-              <p:nvPr/>
-            </p:nvSpPr>
-            <p:spPr>
-              <a:xfrm>
-                <a:off x="723900" y="2298700"/>
-                <a:ext cx="228600" cy="368300"/>
-              </a:xfrm>
-              <a:prstGeom prst="rect">
-                <a:avLst/>
-              </a:prstGeom>
-              <a:solidFill>
-                <a:schemeClr val="tx2">
-                  <a:lumMod val="20000"/>
-                  <a:lumOff val="80000"/>
-                </a:schemeClr>
-              </a:solidFill>
-            </p:spPr>
-            <p:style>
-              <a:lnRef idx="1">
-                <a:schemeClr val="accent1"/>
-              </a:lnRef>
-              <a:fillRef idx="3">
-                <a:schemeClr val="accent1"/>
-              </a:fillRef>
-              <a:effectRef idx="2">
-                <a:schemeClr val="accent1"/>
-              </a:effectRef>
-              <a:fontRef idx="minor">
-                <a:schemeClr val="lt1"/>
-              </a:fontRef>
-            </p:style>
-            <p:txBody>
-              <a:bodyPr rtlCol="0" anchor="ctr"/>
-              <a:lstStyle/>
-              <a:p>
-                <a:pPr algn="ctr"/>
-                <a:endParaRPr lang="en-US"/>
-              </a:p>
-            </p:txBody>
-          </p:sp>
-          <p:sp>
-            <p:nvSpPr>
-              <p:cNvPr id="54" name="Rectangle 53"/>
-              <p:cNvSpPr/>
-              <p:nvPr/>
-            </p:nvSpPr>
-            <p:spPr>
-              <a:xfrm>
-                <a:off x="1016000" y="2298700"/>
-                <a:ext cx="228600" cy="368300"/>
-              </a:xfrm>
-              <a:prstGeom prst="rect">
-                <a:avLst/>
-              </a:prstGeom>
-              <a:solidFill>
-                <a:schemeClr val="tx2">
-                  <a:lumMod val="40000"/>
-                  <a:lumOff val="60000"/>
-                </a:schemeClr>
-              </a:solidFill>
-            </p:spPr>
-            <p:style>
-              <a:lnRef idx="1">
-                <a:schemeClr val="accent1"/>
-              </a:lnRef>
-              <a:fillRef idx="3">
-                <a:schemeClr val="accent1"/>
-              </a:fillRef>
-              <a:effectRef idx="2">
-                <a:schemeClr val="accent1"/>
-              </a:effectRef>
-              <a:fontRef idx="minor">
-                <a:schemeClr val="lt1"/>
-              </a:fontRef>
-            </p:style>
-            <p:txBody>
-              <a:bodyPr rtlCol="0" anchor="ctr"/>
-              <a:lstStyle/>
-              <a:p>
-                <a:pPr algn="ctr"/>
-                <a:endParaRPr lang="en-US">
-                  <a:solidFill>
-                    <a:schemeClr val="tx1">
-                      <a:lumMod val="50000"/>
-                      <a:lumOff val="50000"/>
-                    </a:schemeClr>
-                  </a:solidFill>
-                </a:endParaRPr>
-              </a:p>
-            </p:txBody>
-          </p:sp>
-          <p:sp>
-            <p:nvSpPr>
-              <p:cNvPr id="55" name="Rectangle 54"/>
-              <p:cNvSpPr/>
-              <p:nvPr/>
-            </p:nvSpPr>
-            <p:spPr>
-              <a:xfrm>
-                <a:off x="1308100" y="2298700"/>
-                <a:ext cx="228600" cy="368300"/>
-              </a:xfrm>
-              <a:prstGeom prst="rect">
-                <a:avLst/>
-              </a:prstGeom>
-              <a:solidFill>
-                <a:schemeClr val="tx2">
-                  <a:lumMod val="60000"/>
-                  <a:lumOff val="40000"/>
-                </a:schemeClr>
-              </a:solidFill>
-            </p:spPr>
-            <p:style>
-              <a:lnRef idx="1">
-                <a:schemeClr val="accent1"/>
-              </a:lnRef>
-              <a:fillRef idx="3">
-                <a:schemeClr val="accent1"/>
-              </a:fillRef>
-              <a:effectRef idx="2">
-                <a:schemeClr val="accent1"/>
-              </a:effectRef>
-              <a:fontRef idx="minor">
-                <a:schemeClr val="lt1"/>
-              </a:fontRef>
-            </p:style>
-            <p:txBody>
-              <a:bodyPr rtlCol="0" anchor="ctr"/>
-              <a:lstStyle/>
-              <a:p>
-                <a:pPr algn="ctr"/>
-                <a:endParaRPr lang="en-US"/>
-              </a:p>
-            </p:txBody>
-          </p:sp>
-          <p:sp>
-            <p:nvSpPr>
-              <p:cNvPr id="56" name="Rectangle 55"/>
-              <p:cNvSpPr/>
-              <p:nvPr/>
-            </p:nvSpPr>
-            <p:spPr>
-              <a:xfrm>
-                <a:off x="1600200" y="2298700"/>
-                <a:ext cx="228600" cy="368300"/>
-              </a:xfrm>
-              <a:prstGeom prst="rect">
-                <a:avLst/>
-              </a:prstGeom>
-              <a:solidFill>
-                <a:schemeClr val="tx2">
-                  <a:lumMod val="75000"/>
-                </a:schemeClr>
-              </a:solidFill>
-            </p:spPr>
-            <p:style>
-              <a:lnRef idx="1">
-                <a:schemeClr val="accent1"/>
-              </a:lnRef>
-              <a:fillRef idx="3">
-                <a:schemeClr val="accent1"/>
-              </a:fillRef>
-              <a:effectRef idx="2">
-                <a:schemeClr val="accent1"/>
-              </a:effectRef>
-              <a:fontRef idx="minor">
-                <a:schemeClr val="lt1"/>
-              </a:fontRef>
-            </p:style>
-            <p:txBody>
-              <a:bodyPr rtlCol="0" anchor="ctr"/>
-              <a:lstStyle/>
-              <a:p>
-                <a:pPr algn="ctr"/>
-                <a:endParaRPr lang="en-US"/>
-              </a:p>
-            </p:txBody>
-          </p:sp>
-          <p:sp>
-            <p:nvSpPr>
-              <p:cNvPr id="57" name="Rectangle 56"/>
-              <p:cNvSpPr/>
-              <p:nvPr/>
-            </p:nvSpPr>
-            <p:spPr>
-              <a:xfrm>
-                <a:off x="1905000" y="2298700"/>
-                <a:ext cx="228600" cy="368300"/>
-              </a:xfrm>
-              <a:prstGeom prst="rect">
-                <a:avLst/>
-              </a:prstGeom>
-              <a:solidFill>
-                <a:schemeClr val="tx2">
-                  <a:lumMod val="50000"/>
-                </a:schemeClr>
-              </a:solidFill>
-            </p:spPr>
-            <p:style>
-              <a:lnRef idx="1">
-                <a:schemeClr val="accent1"/>
-              </a:lnRef>
-              <a:fillRef idx="3">
-                <a:schemeClr val="accent1"/>
-              </a:fillRef>
-              <a:effectRef idx="2">
-                <a:schemeClr val="accent1"/>
-              </a:effectRef>
-              <a:fontRef idx="minor">
-                <a:schemeClr val="lt1"/>
-              </a:fontRef>
-            </p:style>
-            <p:txBody>
-              <a:bodyPr rtlCol="0" anchor="ctr"/>
-              <a:lstStyle/>
-              <a:p>
-                <a:pPr algn="ctr"/>
-                <a:endParaRPr lang="en-US"/>
-              </a:p>
-            </p:txBody>
-          </p:sp>
-        </p:grpSp>
         <p:sp>
           <p:nvSpPr>
-            <p:cNvPr id="52" name="Right Arrow 51"/>
+            <p:cNvPr id="67" name="Rectangle 66"/>
             <p:cNvSpPr/>
             <p:nvPr/>
           </p:nvSpPr>
           <p:spPr>
             <a:xfrm>
-              <a:off x="6178296" y="1701800"/>
-              <a:ext cx="349504" cy="304800"/>
+              <a:off x="4554366" y="2504340"/>
+              <a:ext cx="228600" cy="812440"/>
             </a:xfrm>
-            <a:prstGeom prst="rightArrow">
+            <a:prstGeom prst="rect">
               <a:avLst/>
             </a:prstGeom>
+            <a:solidFill>
+              <a:schemeClr val="accent3">
+                <a:lumMod val="60000"/>
+                <a:lumOff val="40000"/>
+              </a:schemeClr>
+            </a:solidFill>
+          </p:spPr>
+          <p:style>
+            <a:lnRef idx="1">
+              <a:schemeClr val="accent1"/>
+            </a:lnRef>
+            <a:fillRef idx="3">
+              <a:schemeClr val="accent1"/>
+            </a:fillRef>
+            <a:effectRef idx="2">
+              <a:schemeClr val="accent1"/>
+            </a:effectRef>
+            <a:fontRef idx="minor">
+              <a:schemeClr val="lt1"/>
+            </a:fontRef>
+          </p:style>
+          <p:txBody>
+            <a:bodyPr rtlCol="0" anchor="ctr"/>
+            <a:lstStyle/>
+            <a:p>
+              <a:pPr algn="ctr"/>
+              <a:endParaRPr lang="en-US"/>
+            </a:p>
+          </p:txBody>
+        </p:sp>
+        <p:sp>
+          <p:nvSpPr>
+            <p:cNvPr id="68" name="Rectangle 67"/>
+            <p:cNvSpPr/>
+            <p:nvPr/>
+          </p:nvSpPr>
+          <p:spPr>
+            <a:xfrm>
+              <a:off x="5144916" y="2504340"/>
+              <a:ext cx="228600" cy="812440"/>
+            </a:xfrm>
+            <a:prstGeom prst="rect">
+              <a:avLst/>
+            </a:prstGeom>
+            <a:solidFill>
+              <a:schemeClr val="accent3">
+                <a:lumMod val="50000"/>
+              </a:schemeClr>
+            </a:solidFill>
+          </p:spPr>
+          <p:style>
+            <a:lnRef idx="1">
+              <a:schemeClr val="accent1"/>
+            </a:lnRef>
+            <a:fillRef idx="3">
+              <a:schemeClr val="accent1"/>
+            </a:fillRef>
+            <a:effectRef idx="2">
+              <a:schemeClr val="accent1"/>
+            </a:effectRef>
+            <a:fontRef idx="minor">
+              <a:schemeClr val="lt1"/>
+            </a:fontRef>
+          </p:style>
+          <p:txBody>
+            <a:bodyPr rtlCol="0" anchor="ctr"/>
+            <a:lstStyle/>
+            <a:p>
+              <a:pPr algn="ctr"/>
+              <a:endParaRPr lang="en-US"/>
+            </a:p>
+          </p:txBody>
+        </p:sp>
+        <p:sp>
+          <p:nvSpPr>
+            <p:cNvPr id="69" name="Rectangle 68"/>
+            <p:cNvSpPr/>
+            <p:nvPr/>
+          </p:nvSpPr>
+          <p:spPr>
+            <a:xfrm>
+              <a:off x="4849641" y="2504340"/>
+              <a:ext cx="228600" cy="812440"/>
+            </a:xfrm>
+            <a:prstGeom prst="rect">
+              <a:avLst/>
+            </a:prstGeom>
+            <a:solidFill>
+              <a:schemeClr val="accent3">
+                <a:lumMod val="75000"/>
+              </a:schemeClr>
+            </a:solidFill>
           </p:spPr>
           <p:style>
             <a:lnRef idx="1">
@@ -4179,275 +4165,124 @@
       </p:grpSp>
       <p:grpSp>
         <p:nvGrpSpPr>
-          <p:cNvPr id="58" name="Group 57"/>
+          <p:cNvPr id="4" name="Group 3"/>
           <p:cNvGrpSpPr/>
           <p:nvPr/>
         </p:nvGrpSpPr>
         <p:grpSpPr>
           <a:xfrm>
-            <a:off x="4017083" y="4520840"/>
-            <a:ext cx="1803400" cy="368300"/>
-            <a:chOff x="4724400" y="1676400"/>
-            <a:chExt cx="1803400" cy="368300"/>
+            <a:off x="4554366" y="4335042"/>
+            <a:ext cx="819150" cy="812440"/>
+            <a:chOff x="4554366" y="4335042"/>
+            <a:chExt cx="819150" cy="812440"/>
           </a:xfrm>
         </p:grpSpPr>
-        <p:grpSp>
-          <p:nvGrpSpPr>
-            <p:cNvPr id="59" name="Group 58"/>
-            <p:cNvGrpSpPr/>
-            <p:nvPr/>
-          </p:nvGrpSpPr>
-          <p:grpSpPr>
-            <a:xfrm>
-              <a:off x="4724400" y="1676400"/>
-              <a:ext cx="1409700" cy="368300"/>
-              <a:chOff x="723900" y="2298700"/>
-              <a:chExt cx="1409700" cy="368300"/>
-            </a:xfrm>
-          </p:grpSpPr>
-          <p:sp>
-            <p:nvSpPr>
-              <p:cNvPr id="61" name="Rectangle 60"/>
-              <p:cNvSpPr/>
-              <p:nvPr/>
-            </p:nvSpPr>
-            <p:spPr>
-              <a:xfrm>
-                <a:off x="723900" y="2298700"/>
-                <a:ext cx="228600" cy="368300"/>
-              </a:xfrm>
-              <a:prstGeom prst="rect">
-                <a:avLst/>
-              </a:prstGeom>
-              <a:solidFill>
-                <a:schemeClr val="tx2">
-                  <a:lumMod val="20000"/>
-                  <a:lumOff val="80000"/>
-                </a:schemeClr>
-              </a:solidFill>
-            </p:spPr>
-            <p:style>
-              <a:lnRef idx="1">
-                <a:schemeClr val="accent1"/>
-              </a:lnRef>
-              <a:fillRef idx="3">
-                <a:schemeClr val="accent1"/>
-              </a:fillRef>
-              <a:effectRef idx="2">
-                <a:schemeClr val="accent1"/>
-              </a:effectRef>
-              <a:fontRef idx="minor">
-                <a:schemeClr val="lt1"/>
-              </a:fontRef>
-            </p:style>
-            <p:txBody>
-              <a:bodyPr rtlCol="0" anchor="ctr"/>
-              <a:lstStyle/>
-              <a:p>
-                <a:pPr algn="ctr"/>
-                <a:endParaRPr lang="en-US"/>
-              </a:p>
-            </p:txBody>
-          </p:sp>
-          <p:sp>
-            <p:nvSpPr>
-              <p:cNvPr id="62" name="Rectangle 61"/>
-              <p:cNvSpPr/>
-              <p:nvPr/>
-            </p:nvSpPr>
-            <p:spPr>
-              <a:xfrm>
-                <a:off x="1016000" y="2298700"/>
-                <a:ext cx="228600" cy="368300"/>
-              </a:xfrm>
-              <a:prstGeom prst="rect">
-                <a:avLst/>
-              </a:prstGeom>
-              <a:solidFill>
-                <a:schemeClr val="tx2">
-                  <a:lumMod val="40000"/>
-                  <a:lumOff val="60000"/>
-                </a:schemeClr>
-              </a:solidFill>
-            </p:spPr>
-            <p:style>
-              <a:lnRef idx="1">
-                <a:schemeClr val="accent1"/>
-              </a:lnRef>
-              <a:fillRef idx="3">
-                <a:schemeClr val="accent1"/>
-              </a:fillRef>
-              <a:effectRef idx="2">
-                <a:schemeClr val="accent1"/>
-              </a:effectRef>
-              <a:fontRef idx="minor">
-                <a:schemeClr val="lt1"/>
-              </a:fontRef>
-            </p:style>
-            <p:txBody>
-              <a:bodyPr rtlCol="0" anchor="ctr"/>
-              <a:lstStyle/>
-              <a:p>
-                <a:pPr algn="ctr"/>
-                <a:endParaRPr lang="en-US">
-                  <a:solidFill>
-                    <a:schemeClr val="tx1">
-                      <a:lumMod val="50000"/>
-                      <a:lumOff val="50000"/>
-                    </a:schemeClr>
-                  </a:solidFill>
-                </a:endParaRPr>
-              </a:p>
-            </p:txBody>
-          </p:sp>
-          <p:sp>
-            <p:nvSpPr>
-              <p:cNvPr id="63" name="Rectangle 62"/>
-              <p:cNvSpPr/>
-              <p:nvPr/>
-            </p:nvSpPr>
-            <p:spPr>
-              <a:xfrm>
-                <a:off x="1308100" y="2298700"/>
-                <a:ext cx="228600" cy="368300"/>
-              </a:xfrm>
-              <a:prstGeom prst="rect">
-                <a:avLst/>
-              </a:prstGeom>
-              <a:solidFill>
-                <a:schemeClr val="tx2">
-                  <a:lumMod val="60000"/>
-                  <a:lumOff val="40000"/>
-                </a:schemeClr>
-              </a:solidFill>
-            </p:spPr>
-            <p:style>
-              <a:lnRef idx="1">
-                <a:schemeClr val="accent1"/>
-              </a:lnRef>
-              <a:fillRef idx="3">
-                <a:schemeClr val="accent1"/>
-              </a:fillRef>
-              <a:effectRef idx="2">
-                <a:schemeClr val="accent1"/>
-              </a:effectRef>
-              <a:fontRef idx="minor">
-                <a:schemeClr val="lt1"/>
-              </a:fontRef>
-            </p:style>
-            <p:txBody>
-              <a:bodyPr rtlCol="0" anchor="ctr"/>
-              <a:lstStyle/>
-              <a:p>
-                <a:pPr algn="ctr"/>
-                <a:endParaRPr lang="en-US"/>
-              </a:p>
-            </p:txBody>
-          </p:sp>
-          <p:sp>
-            <p:nvSpPr>
-              <p:cNvPr id="64" name="Rectangle 63"/>
-              <p:cNvSpPr/>
-              <p:nvPr/>
-            </p:nvSpPr>
-            <p:spPr>
-              <a:xfrm>
-                <a:off x="1600200" y="2298700"/>
-                <a:ext cx="228600" cy="368300"/>
-              </a:xfrm>
-              <a:prstGeom prst="rect">
-                <a:avLst/>
-              </a:prstGeom>
-              <a:solidFill>
-                <a:schemeClr val="tx2">
-                  <a:lumMod val="75000"/>
-                </a:schemeClr>
-              </a:solidFill>
-            </p:spPr>
-            <p:style>
-              <a:lnRef idx="1">
-                <a:schemeClr val="accent1"/>
-              </a:lnRef>
-              <a:fillRef idx="3">
-                <a:schemeClr val="accent1"/>
-              </a:fillRef>
-              <a:effectRef idx="2">
-                <a:schemeClr val="accent1"/>
-              </a:effectRef>
-              <a:fontRef idx="minor">
-                <a:schemeClr val="lt1"/>
-              </a:fontRef>
-            </p:style>
-            <p:txBody>
-              <a:bodyPr rtlCol="0" anchor="ctr"/>
-              <a:lstStyle/>
-              <a:p>
-                <a:pPr algn="ctr"/>
-                <a:endParaRPr lang="en-US"/>
-              </a:p>
-            </p:txBody>
-          </p:sp>
-          <p:sp>
-            <p:nvSpPr>
-              <p:cNvPr id="65" name="Rectangle 64"/>
-              <p:cNvSpPr/>
-              <p:nvPr/>
-            </p:nvSpPr>
-            <p:spPr>
-              <a:xfrm>
-                <a:off x="1905000" y="2298700"/>
-                <a:ext cx="228600" cy="368300"/>
-              </a:xfrm>
-              <a:prstGeom prst="rect">
-                <a:avLst/>
-              </a:prstGeom>
-              <a:solidFill>
-                <a:schemeClr val="tx2">
-                  <a:lumMod val="50000"/>
-                </a:schemeClr>
-              </a:solidFill>
-              <a:ln>
-                <a:prstDash val="sysDash"/>
-              </a:ln>
-            </p:spPr>
-            <p:style>
-              <a:lnRef idx="1">
-                <a:schemeClr val="accent1"/>
-              </a:lnRef>
-              <a:fillRef idx="3">
-                <a:schemeClr val="accent1"/>
-              </a:fillRef>
-              <a:effectRef idx="2">
-                <a:schemeClr val="accent1"/>
-              </a:effectRef>
-              <a:fontRef idx="minor">
-                <a:schemeClr val="lt1"/>
-              </a:fontRef>
-            </p:style>
-            <p:txBody>
-              <a:bodyPr rtlCol="0" anchor="ctr"/>
-              <a:lstStyle/>
-              <a:p>
-                <a:pPr algn="ctr"/>
-                <a:endParaRPr lang="en-US"/>
-              </a:p>
-            </p:txBody>
-          </p:sp>
-        </p:grpSp>
         <p:sp>
           <p:nvSpPr>
-            <p:cNvPr id="60" name="Right Arrow 59"/>
+            <p:cNvPr id="70" name="Rectangle 69"/>
             <p:cNvSpPr/>
             <p:nvPr/>
           </p:nvSpPr>
           <p:spPr>
             <a:xfrm>
-              <a:off x="6178296" y="1701800"/>
-              <a:ext cx="349504" cy="304800"/>
+              <a:off x="4554366" y="4335042"/>
+              <a:ext cx="228600" cy="812440"/>
             </a:xfrm>
-            <a:prstGeom prst="rightArrow">
+            <a:prstGeom prst="rect">
               <a:avLst/>
             </a:prstGeom>
+            <a:solidFill>
+              <a:schemeClr val="accent6">
+                <a:lumMod val="60000"/>
+                <a:lumOff val="40000"/>
+              </a:schemeClr>
+            </a:solidFill>
+          </p:spPr>
+          <p:style>
+            <a:lnRef idx="1">
+              <a:schemeClr val="accent1"/>
+            </a:lnRef>
+            <a:fillRef idx="3">
+              <a:schemeClr val="accent1"/>
+            </a:fillRef>
+            <a:effectRef idx="2">
+              <a:schemeClr val="accent1"/>
+            </a:effectRef>
+            <a:fontRef idx="minor">
+              <a:schemeClr val="lt1"/>
+            </a:fontRef>
+          </p:style>
+          <p:txBody>
+            <a:bodyPr rtlCol="0" anchor="ctr"/>
+            <a:lstStyle/>
+            <a:p>
+              <a:pPr algn="ctr"/>
+              <a:endParaRPr lang="en-US"/>
+            </a:p>
+          </p:txBody>
+        </p:sp>
+        <p:sp>
+          <p:nvSpPr>
+            <p:cNvPr id="71" name="Rectangle 70"/>
+            <p:cNvSpPr/>
+            <p:nvPr/>
+          </p:nvSpPr>
+          <p:spPr>
+            <a:xfrm>
+              <a:off x="5144916" y="4335042"/>
+              <a:ext cx="228600" cy="812440"/>
+            </a:xfrm>
+            <a:prstGeom prst="rect">
+              <a:avLst/>
+            </a:prstGeom>
+            <a:solidFill>
+              <a:schemeClr val="accent6">
+                <a:lumMod val="50000"/>
+              </a:schemeClr>
+            </a:solidFill>
+          </p:spPr>
+          <p:style>
+            <a:lnRef idx="1">
+              <a:schemeClr val="accent1"/>
+            </a:lnRef>
+            <a:fillRef idx="3">
+              <a:schemeClr val="accent1"/>
+            </a:fillRef>
+            <a:effectRef idx="2">
+              <a:schemeClr val="accent1"/>
+            </a:effectRef>
+            <a:fontRef idx="minor">
+              <a:schemeClr val="lt1"/>
+            </a:fontRef>
+          </p:style>
+          <p:txBody>
+            <a:bodyPr rtlCol="0" anchor="ctr"/>
+            <a:lstStyle/>
+            <a:p>
+              <a:pPr algn="ctr"/>
+              <a:endParaRPr lang="en-US"/>
+            </a:p>
+          </p:txBody>
+        </p:sp>
+        <p:sp>
+          <p:nvSpPr>
+            <p:cNvPr id="72" name="Rectangle 71"/>
+            <p:cNvSpPr/>
+            <p:nvPr/>
+          </p:nvSpPr>
+          <p:spPr>
+            <a:xfrm>
+              <a:off x="4849641" y="4335042"/>
+              <a:ext cx="228600" cy="812440"/>
+            </a:xfrm>
+            <a:prstGeom prst="rect">
+              <a:avLst/>
+            </a:prstGeom>
+            <a:solidFill>
+              <a:schemeClr val="accent6">
+                <a:lumMod val="75000"/>
+              </a:schemeClr>
+            </a:solidFill>
           </p:spPr>
           <p:style>
             <a:lnRef idx="1">
@@ -4475,23 +4310,26 @@
       </p:grpSp>
       <p:cxnSp>
         <p:nvCxnSpPr>
-          <p:cNvPr id="5" name="Straight Connector 4"/>
-          <p:cNvCxnSpPr/>
+          <p:cNvPr id="9" name="Elbow Connector 8"/>
+          <p:cNvCxnSpPr>
+            <a:stCxn id="16" idx="3"/>
+            <a:endCxn id="20" idx="3"/>
+          </p:cNvCxnSpPr>
           <p:nvPr/>
         </p:nvCxnSpPr>
         <p:spPr>
           <a:xfrm>
-            <a:off x="6738698" y="3708400"/>
-            <a:ext cx="0" cy="238003"/>
+            <a:off x="7700083" y="1543050"/>
+            <a:ext cx="12700" cy="1371600"/>
           </a:xfrm>
-          <a:prstGeom prst="line">
-            <a:avLst/>
+          <a:prstGeom prst="bentConnector3">
+            <a:avLst>
+              <a:gd name="adj1" fmla="val 1800000"/>
+            </a:avLst>
           </a:prstGeom>
           <a:ln>
-            <a:solidFill>
-              <a:srgbClr val="4F81BD"/>
-            </a:solidFill>
-            <a:prstDash val="dot"/>
+            <a:prstDash val="sysDash"/>
+            <a:tailEnd type="arrow"/>
           </a:ln>
         </p:spPr>
         <p:style>
@@ -4509,6 +4347,72 @@
           </a:fontRef>
         </p:style>
       </p:cxnSp>
+      <p:cxnSp>
+        <p:nvCxnSpPr>
+          <p:cNvPr id="74" name="Elbow Connector 73"/>
+          <p:cNvCxnSpPr>
+            <a:endCxn id="21" idx="3"/>
+          </p:cNvCxnSpPr>
+          <p:nvPr/>
+        </p:nvCxnSpPr>
+        <p:spPr>
+          <a:xfrm rot="5400000">
+            <a:off x="7256997" y="4037187"/>
+            <a:ext cx="1085490" cy="199317"/>
+          </a:xfrm>
+          <a:prstGeom prst="bentConnector2">
+            <a:avLst/>
+          </a:prstGeom>
+          <a:ln>
+            <a:prstDash val="sysDash"/>
+            <a:tailEnd type="arrow"/>
+          </a:ln>
+        </p:spPr>
+        <p:style>
+          <a:lnRef idx="2">
+            <a:schemeClr val="accent1"/>
+          </a:lnRef>
+          <a:fillRef idx="0">
+            <a:schemeClr val="accent1"/>
+          </a:fillRef>
+          <a:effectRef idx="1">
+            <a:schemeClr val="accent1"/>
+          </a:effectRef>
+          <a:fontRef idx="minor">
+            <a:schemeClr val="tx1"/>
+          </a:fontRef>
+        </p:style>
+      </p:cxnSp>
+      <p:sp>
+        <p:nvSpPr>
+          <p:cNvPr id="34" name="TextBox 33"/>
+          <p:cNvSpPr txBox="1"/>
+          <p:nvPr/>
+        </p:nvSpPr>
+        <p:spPr>
+          <a:xfrm rot="16200000">
+            <a:off x="7064773" y="2914134"/>
+            <a:ext cx="2103122" cy="369332"/>
+          </a:xfrm>
+          <a:prstGeom prst="rect">
+            <a:avLst/>
+          </a:prstGeom>
+          <a:noFill/>
+        </p:spPr>
+        <p:txBody>
+          <a:bodyPr wrap="none" rtlCol="0">
+            <a:spAutoFit/>
+          </a:bodyPr>
+          <a:lstStyle/>
+          <a:p>
+            <a:r>
+              <a:rPr lang="en-US" dirty="0" smtClean="0"/>
+              <a:t>Initial values passing</a:t>
+            </a:r>
+            <a:endParaRPr lang="en-US" dirty="0"/>
+          </a:p>
+        </p:txBody>
+      </p:sp>
     </p:spTree>
     <p:extLst>
       <p:ext uri="{BB962C8B-B14F-4D97-AF65-F5344CB8AC3E}">

</xml_diff>